<commit_message>
Update Project 2_Housing Data (Overall).pptx
Update pptx
</commit_message>
<xml_diff>
--- a/Project 2_Housing Data (Overall).pptx
+++ b/Project 2_Housing Data (Overall).pptx
@@ -7008,7 +7008,7 @@
                   <a:srgbClr val="FFFFFF"/>
                 </a:solidFill>
               </a:rPr>
-              <a:t>#1 : Numerical data (SFS)</a:t>
+              <a:t>#2 : Numerical data (SFS)</a:t>
             </a:r>
             <a:endParaRPr b="1" sz="1200">
               <a:solidFill>
@@ -7066,7 +7066,7 @@
                   <a:srgbClr val="FFFFFF"/>
                 </a:solidFill>
               </a:rPr>
-              <a:t>#1 : Categorical data (SFS)</a:t>
+              <a:t>#3 : Categorical data (SFS)</a:t>
             </a:r>
             <a:endParaRPr b="1" sz="1200">
               <a:solidFill>
@@ -7124,7 +7124,7 @@
                   <a:srgbClr val="FFFFFF"/>
                 </a:solidFill>
               </a:rPr>
-              <a:t>#1 : Selected by RFE</a:t>
+              <a:t>#4 : Selected by RFE</a:t>
             </a:r>
             <a:endParaRPr b="1" sz="1200">
               <a:solidFill>
@@ -7182,7 +7182,7 @@
                   <a:srgbClr val="FFFFFF"/>
                 </a:solidFill>
               </a:rPr>
-              <a:t>#1 : Numerical + Categorical (SFS)</a:t>
+              <a:t>#5 : Numerical + Categorical (SFS)</a:t>
             </a:r>
             <a:endParaRPr b="1" sz="1200">
               <a:solidFill>

</xml_diff>